<commit_message>
Added presentation waiting for video on app
</commit_message>
<xml_diff>
--- a/PrezentacijaDiplomski.pptx
+++ b/PrezentacijaDiplomski.pptx
@@ -8,6 +8,13 @@
     <p:sldId id="256" r:id="rId2"/>
     <p:sldId id="257" r:id="rId3"/>
     <p:sldId id="258" r:id="rId4"/>
+    <p:sldId id="259" r:id="rId5"/>
+    <p:sldId id="260" r:id="rId6"/>
+    <p:sldId id="261" r:id="rId7"/>
+    <p:sldId id="262" r:id="rId8"/>
+    <p:sldId id="263" r:id="rId9"/>
+    <p:sldId id="264" r:id="rId10"/>
+    <p:sldId id="265" r:id="rId11"/>
   </p:sldIdLst>
   <p:sldSz cx="12192000" cy="6858000"/>
   <p:notesSz cx="6858000" cy="9144000"/>
@@ -118,6 +125,25 @@
         <p14:section name="Опис система" id="{4BDD6DEC-60FB-4D0E-B6C5-A76D5B098AAE}">
           <p14:sldIdLst>
             <p14:sldId id="258"/>
+          </p14:sldIdLst>
+        </p14:section>
+        <p14:section name="Базе података" id="{79DE03E4-0FCA-47D2-80F1-76A8C1DDEF78}">
+          <p14:sldIdLst>
+            <p14:sldId id="259"/>
+            <p14:sldId id="260"/>
+            <p14:sldId id="261"/>
+            <p14:sldId id="262"/>
+          </p14:sldIdLst>
+        </p14:section>
+        <p14:section name="Апликативно решење" id="{984BDDE7-1D8D-4FB8-B6F3-BB6A2D4C42E2}">
+          <p14:sldIdLst>
+            <p14:sldId id="263"/>
+          </p14:sldIdLst>
+        </p14:section>
+        <p14:section name="Закључак" id="{61A69952-9DD4-4254-B187-1D86670B2798}">
+          <p14:sldIdLst>
+            <p14:sldId id="264"/>
+            <p14:sldId id="265"/>
           </p14:sldIdLst>
         </p14:section>
       </p14:sectionLst>
@@ -13819,6 +13845,63 @@
 </p:sld>
 </file>
 
+<file path=ppt/slides/slide10.xml><?xml version="1.0" encoding="utf-8"?>
+<p:sld xmlns:a="http://schemas.openxmlformats.org/drawingml/2006/main" xmlns:r="http://schemas.openxmlformats.org/officeDocument/2006/relationships" xmlns:p="http://schemas.openxmlformats.org/presentationml/2006/main">
+  <p:cSld>
+    <p:spTree>
+      <p:nvGrpSpPr>
+        <p:cNvPr id="1" name=""/>
+        <p:cNvGrpSpPr/>
+        <p:nvPr/>
+      </p:nvGrpSpPr>
+      <p:grpSpPr>
+        <a:xfrm>
+          <a:off x="0" y="0"/>
+          <a:ext cx="0" cy="0"/>
+          <a:chOff x="0" y="0"/>
+          <a:chExt cx="0" cy="0"/>
+        </a:xfrm>
+      </p:grpSpPr>
+      <p:sp>
+        <p:nvSpPr>
+          <p:cNvPr id="4" name="Title 3"/>
+          <p:cNvSpPr>
+            <a:spLocks noGrp="1"/>
+          </p:cNvSpPr>
+          <p:nvPr>
+            <p:ph type="ctrTitle"/>
+          </p:nvPr>
+        </p:nvSpPr>
+        <p:spPr/>
+        <p:txBody>
+          <a:bodyPr/>
+          <a:lstStyle/>
+          <a:p>
+            <a:pPr algn="ctr"/>
+            <a:r>
+              <a:rPr lang="sr-Cyrl-RS" dirty="0" smtClean="0"/>
+              <a:t>Хвала на пажњи!</a:t>
+            </a:r>
+            <a:br>
+              <a:rPr lang="sr-Cyrl-RS" dirty="0" smtClean="0"/>
+            </a:br>
+            <a:endParaRPr lang="en-US" dirty="0"/>
+          </a:p>
+        </p:txBody>
+      </p:sp>
+    </p:spTree>
+    <p:extLst>
+      <p:ext uri="{BB962C8B-B14F-4D97-AF65-F5344CB8AC3E}">
+        <p14:creationId xmlns:p14="http://schemas.microsoft.com/office/powerpoint/2010/main" val="332060760"/>
+      </p:ext>
+    </p:extLst>
+  </p:cSld>
+  <p:clrMapOvr>
+    <a:masterClrMapping/>
+  </p:clrMapOvr>
+</p:sld>
+</file>
+
 <file path=ppt/slides/slide2.xml><?xml version="1.0" encoding="utf-8"?>
 <p:sld xmlns:a="http://schemas.openxmlformats.org/drawingml/2006/main" xmlns:r="http://schemas.openxmlformats.org/officeDocument/2006/relationships" xmlns:p="http://schemas.openxmlformats.org/presentationml/2006/main">
   <p:cSld>
@@ -13969,7 +14052,11 @@
             <a:pPr algn="ctr"/>
             <a:r>
               <a:rPr lang="sr-Cyrl-RS" dirty="0" smtClean="0"/>
-              <a:t>Опис информационог система</a:t>
+              <a:t>Опис </a:t>
+            </a:r>
+            <a:r>
+              <a:rPr lang="sr-Cyrl-RS" dirty="0" smtClean="0"/>
+              <a:t>информационог система</a:t>
             </a:r>
             <a:endParaRPr lang="en-US" dirty="0"/>
           </a:p>
@@ -14003,8 +14090,29 @@
           <a:p>
             <a:r>
               <a:rPr lang="sr-Cyrl-RS" sz="2400" dirty="0" smtClean="0"/>
-              <a:t>Аутентификација и ауторизација корисника</a:t>
+              <a:t>Омогућена аутентификација </a:t>
             </a:r>
+            <a:r>
+              <a:rPr lang="sr-Cyrl-RS" sz="2400" dirty="0" smtClean="0"/>
+              <a:t>и ауторизација </a:t>
+            </a:r>
+            <a:r>
+              <a:rPr lang="sr-Cyrl-RS" sz="2400" dirty="0" smtClean="0"/>
+              <a:t>корисника</a:t>
+            </a:r>
+          </a:p>
+          <a:p>
+            <a:r>
+              <a:rPr lang="sr-Cyrl-RS" sz="2400" dirty="0" smtClean="0"/>
+              <a:t>Корисницима омогућене неопходне функционалности зависно од њихове улоге у оквиру система</a:t>
+            </a:r>
+          </a:p>
+          <a:p>
+            <a:r>
+              <a:rPr lang="sr-Cyrl-RS" sz="2400" dirty="0" smtClean="0"/>
+              <a:t>Неопходна иницијализација базе података за несметани рад запослених у оквиру система</a:t>
+            </a:r>
+            <a:endParaRPr lang="sr-Cyrl-RS" sz="2400" dirty="0" smtClean="0"/>
           </a:p>
           <a:p>
             <a:endParaRPr lang="en-US" sz="2400" dirty="0"/>
@@ -14015,6 +14123,614 @@
     <p:extLst>
       <p:ext uri="{BB962C8B-B14F-4D97-AF65-F5344CB8AC3E}">
         <p14:creationId xmlns:p14="http://schemas.microsoft.com/office/powerpoint/2010/main" val="3985644089"/>
+      </p:ext>
+    </p:extLst>
+  </p:cSld>
+  <p:clrMapOvr>
+    <a:masterClrMapping/>
+  </p:clrMapOvr>
+</p:sld>
+</file>
+
+<file path=ppt/slides/slide4.xml><?xml version="1.0" encoding="utf-8"?>
+<p:sld xmlns:a="http://schemas.openxmlformats.org/drawingml/2006/main" xmlns:r="http://schemas.openxmlformats.org/officeDocument/2006/relationships" xmlns:p="http://schemas.openxmlformats.org/presentationml/2006/main">
+  <p:cSld>
+    <p:spTree>
+      <p:nvGrpSpPr>
+        <p:cNvPr id="1" name=""/>
+        <p:cNvGrpSpPr/>
+        <p:nvPr/>
+      </p:nvGrpSpPr>
+      <p:grpSpPr>
+        <a:xfrm>
+          <a:off x="0" y="0"/>
+          <a:ext cx="0" cy="0"/>
+          <a:chOff x="0" y="0"/>
+          <a:chExt cx="0" cy="0"/>
+        </a:xfrm>
+      </p:grpSpPr>
+      <p:sp>
+        <p:nvSpPr>
+          <p:cNvPr id="2" name="Title 1"/>
+          <p:cNvSpPr>
+            <a:spLocks noGrp="1"/>
+          </p:cNvSpPr>
+          <p:nvPr>
+            <p:ph type="title"/>
+          </p:nvPr>
+        </p:nvSpPr>
+        <p:spPr/>
+        <p:txBody>
+          <a:bodyPr/>
+          <a:lstStyle/>
+          <a:p>
+            <a:pPr algn="ctr"/>
+            <a:r>
+              <a:rPr lang="sr-Cyrl-RS" dirty="0" smtClean="0">
+                <a:latin typeface="Calibri" panose="020F0502020204030204" pitchFamily="34" charset="0"/>
+                <a:cs typeface="Calibri" panose="020F0502020204030204" pitchFamily="34" charset="0"/>
+              </a:rPr>
+              <a:t>Концептуалне шеме база података</a:t>
+            </a:r>
+            <a:endParaRPr lang="en-US" dirty="0">
+              <a:latin typeface="Calibri" panose="020F0502020204030204" pitchFamily="34" charset="0"/>
+              <a:cs typeface="Calibri" panose="020F0502020204030204" pitchFamily="34" charset="0"/>
+            </a:endParaRPr>
+          </a:p>
+        </p:txBody>
+      </p:sp>
+      <p:sp>
+        <p:nvSpPr>
+          <p:cNvPr id="3" name="Content Placeholder 2"/>
+          <p:cNvSpPr>
+            <a:spLocks noGrp="1"/>
+          </p:cNvSpPr>
+          <p:nvPr>
+            <p:ph idx="1"/>
+          </p:nvPr>
+        </p:nvSpPr>
+        <p:spPr/>
+        <p:txBody>
+          <a:bodyPr>
+            <a:normAutofit/>
+          </a:bodyPr>
+          <a:lstStyle/>
+          <a:p>
+            <a:r>
+              <a:rPr lang="sr-Cyrl-RS" sz="2400" dirty="0" smtClean="0">
+                <a:latin typeface="Calibri" panose="020F0502020204030204" pitchFamily="34" charset="0"/>
+                <a:cs typeface="Calibri" panose="020F0502020204030204" pitchFamily="34" charset="0"/>
+              </a:rPr>
+              <a:t>У оквиру система постоје две базе података</a:t>
+            </a:r>
+          </a:p>
+          <a:p>
+            <a:r>
+              <a:rPr lang="sr-Cyrl-RS" sz="2400" dirty="0" smtClean="0">
+                <a:latin typeface="Calibri" panose="020F0502020204030204" pitchFamily="34" charset="0"/>
+                <a:cs typeface="Calibri" panose="020F0502020204030204" pitchFamily="34" charset="0"/>
+              </a:rPr>
+              <a:t>База података о корисничким информацијама</a:t>
+            </a:r>
+          </a:p>
+          <a:p>
+            <a:r>
+              <a:rPr lang="sr-Cyrl-RS" sz="2400" dirty="0" smtClean="0">
+                <a:latin typeface="Calibri" panose="020F0502020204030204" pitchFamily="34" charset="0"/>
+                <a:cs typeface="Calibri" panose="020F0502020204030204" pitchFamily="34" charset="0"/>
+              </a:rPr>
+              <a:t>База података за евидентирање рада запослених</a:t>
+            </a:r>
+          </a:p>
+          <a:p>
+            <a:endParaRPr lang="en-US" sz="2400" dirty="0">
+              <a:latin typeface="Calibri" panose="020F0502020204030204" pitchFamily="34" charset="0"/>
+              <a:cs typeface="Calibri" panose="020F0502020204030204" pitchFamily="34" charset="0"/>
+            </a:endParaRPr>
+          </a:p>
+        </p:txBody>
+      </p:sp>
+    </p:spTree>
+    <p:extLst>
+      <p:ext uri="{BB962C8B-B14F-4D97-AF65-F5344CB8AC3E}">
+        <p14:creationId xmlns:p14="http://schemas.microsoft.com/office/powerpoint/2010/main" val="638804555"/>
+      </p:ext>
+    </p:extLst>
+  </p:cSld>
+  <p:clrMapOvr>
+    <a:masterClrMapping/>
+  </p:clrMapOvr>
+  <p:timing>
+    <p:tnLst>
+      <p:par>
+        <p:cTn id="1" dur="indefinite" restart="never" nodeType="tmRoot"/>
+      </p:par>
+    </p:tnLst>
+  </p:timing>
+</p:sld>
+</file>
+
+<file path=ppt/slides/slide5.xml><?xml version="1.0" encoding="utf-8"?>
+<p:sld xmlns:a="http://schemas.openxmlformats.org/drawingml/2006/main" xmlns:r="http://schemas.openxmlformats.org/officeDocument/2006/relationships" xmlns:p="http://schemas.openxmlformats.org/presentationml/2006/main">
+  <p:cSld>
+    <p:spTree>
+      <p:nvGrpSpPr>
+        <p:cNvPr id="1" name=""/>
+        <p:cNvGrpSpPr/>
+        <p:nvPr/>
+      </p:nvGrpSpPr>
+      <p:grpSpPr>
+        <a:xfrm>
+          <a:off x="0" y="0"/>
+          <a:ext cx="0" cy="0"/>
+          <a:chOff x="0" y="0"/>
+          <a:chExt cx="0" cy="0"/>
+        </a:xfrm>
+      </p:grpSpPr>
+      <p:sp>
+        <p:nvSpPr>
+          <p:cNvPr id="2" name="Title 1"/>
+          <p:cNvSpPr>
+            <a:spLocks noGrp="1"/>
+          </p:cNvSpPr>
+          <p:nvPr>
+            <p:ph type="title"/>
+          </p:nvPr>
+        </p:nvSpPr>
+        <p:spPr/>
+        <p:txBody>
+          <a:bodyPr/>
+          <a:lstStyle/>
+          <a:p>
+            <a:pPr algn="ctr"/>
+            <a:r>
+              <a:rPr lang="sr-Cyrl-RS" dirty="0" smtClean="0">
+                <a:latin typeface="Calibri" panose="020F0502020204030204" pitchFamily="34" charset="0"/>
+                <a:cs typeface="Calibri" panose="020F0502020204030204" pitchFamily="34" charset="0"/>
+              </a:rPr>
+              <a:t>База података о корисницима – концептуална шема</a:t>
+            </a:r>
+            <a:endParaRPr lang="en-US" dirty="0">
+              <a:latin typeface="Calibri" panose="020F0502020204030204" pitchFamily="34" charset="0"/>
+              <a:cs typeface="Calibri" panose="020F0502020204030204" pitchFamily="34" charset="0"/>
+            </a:endParaRPr>
+          </a:p>
+        </p:txBody>
+      </p:sp>
+      <p:pic>
+        <p:nvPicPr>
+          <p:cNvPr id="7" name="Picture 6"/>
+          <p:cNvPicPr>
+            <a:picLocks noChangeAspect="1"/>
+          </p:cNvPicPr>
+          <p:nvPr/>
+        </p:nvPicPr>
+        <p:blipFill>
+          <a:blip r:embed="rId2"/>
+          <a:stretch>
+            <a:fillRect/>
+          </a:stretch>
+        </p:blipFill>
+        <p:spPr>
+          <a:xfrm>
+            <a:off x="2348465" y="2321096"/>
+            <a:ext cx="8023085" cy="4255338"/>
+          </a:xfrm>
+          <a:prstGeom prst="rect">
+            <a:avLst/>
+          </a:prstGeom>
+        </p:spPr>
+      </p:pic>
+    </p:spTree>
+    <p:extLst>
+      <p:ext uri="{BB962C8B-B14F-4D97-AF65-F5344CB8AC3E}">
+        <p14:creationId xmlns:p14="http://schemas.microsoft.com/office/powerpoint/2010/main" val="2183411185"/>
+      </p:ext>
+    </p:extLst>
+  </p:cSld>
+  <p:clrMapOvr>
+    <a:masterClrMapping/>
+  </p:clrMapOvr>
+  <p:timing>
+    <p:tnLst>
+      <p:par>
+        <p:cTn id="1" dur="indefinite" restart="never" nodeType="tmRoot"/>
+      </p:par>
+    </p:tnLst>
+  </p:timing>
+</p:sld>
+</file>
+
+<file path=ppt/slides/slide6.xml><?xml version="1.0" encoding="utf-8"?>
+<p:sld xmlns:a="http://schemas.openxmlformats.org/drawingml/2006/main" xmlns:r="http://schemas.openxmlformats.org/officeDocument/2006/relationships" xmlns:p="http://schemas.openxmlformats.org/presentationml/2006/main">
+  <p:cSld>
+    <p:spTree>
+      <p:nvGrpSpPr>
+        <p:cNvPr id="1" name=""/>
+        <p:cNvGrpSpPr/>
+        <p:nvPr/>
+      </p:nvGrpSpPr>
+      <p:grpSpPr>
+        <a:xfrm>
+          <a:off x="0" y="0"/>
+          <a:ext cx="0" cy="0"/>
+          <a:chOff x="0" y="0"/>
+          <a:chExt cx="0" cy="0"/>
+        </a:xfrm>
+      </p:grpSpPr>
+      <p:sp>
+        <p:nvSpPr>
+          <p:cNvPr id="2" name="Title 1"/>
+          <p:cNvSpPr>
+            <a:spLocks noGrp="1"/>
+          </p:cNvSpPr>
+          <p:nvPr>
+            <p:ph type="title"/>
+          </p:nvPr>
+        </p:nvSpPr>
+        <p:spPr/>
+        <p:txBody>
+          <a:bodyPr/>
+          <a:lstStyle/>
+          <a:p>
+            <a:pPr algn="ctr"/>
+            <a:r>
+              <a:rPr lang="sr-Cyrl-RS" dirty="0" smtClean="0">
+                <a:latin typeface="Calibri" panose="020F0502020204030204" pitchFamily="34" charset="0"/>
+                <a:cs typeface="Calibri" panose="020F0502020204030204" pitchFamily="34" charset="0"/>
+              </a:rPr>
+              <a:t>База података за евидентирање рада запослених – концептуална шема</a:t>
+            </a:r>
+            <a:endParaRPr lang="en-US" dirty="0">
+              <a:latin typeface="Calibri" panose="020F0502020204030204" pitchFamily="34" charset="0"/>
+              <a:cs typeface="Calibri" panose="020F0502020204030204" pitchFamily="34" charset="0"/>
+            </a:endParaRPr>
+          </a:p>
+        </p:txBody>
+      </p:sp>
+      <p:pic>
+        <p:nvPicPr>
+          <p:cNvPr id="4" name="Picture 3"/>
+          <p:cNvPicPr>
+            <a:picLocks noChangeAspect="1"/>
+          </p:cNvPicPr>
+          <p:nvPr/>
+        </p:nvPicPr>
+        <p:blipFill>
+          <a:blip r:embed="rId2"/>
+          <a:stretch>
+            <a:fillRect/>
+          </a:stretch>
+        </p:blipFill>
+        <p:spPr>
+          <a:xfrm>
+            <a:off x="2019809" y="2216981"/>
+            <a:ext cx="8401845" cy="4641019"/>
+          </a:xfrm>
+          <a:prstGeom prst="rect">
+            <a:avLst/>
+          </a:prstGeom>
+        </p:spPr>
+      </p:pic>
+    </p:spTree>
+    <p:extLst>
+      <p:ext uri="{BB962C8B-B14F-4D97-AF65-F5344CB8AC3E}">
+        <p14:creationId xmlns:p14="http://schemas.microsoft.com/office/powerpoint/2010/main" val="2198291856"/>
+      </p:ext>
+    </p:extLst>
+  </p:cSld>
+  <p:clrMapOvr>
+    <a:masterClrMapping/>
+  </p:clrMapOvr>
+  <p:timing>
+    <p:tnLst>
+      <p:par>
+        <p:cTn id="1" dur="indefinite" restart="never" nodeType="tmRoot"/>
+      </p:par>
+    </p:tnLst>
+  </p:timing>
+</p:sld>
+</file>
+
+<file path=ppt/slides/slide7.xml><?xml version="1.0" encoding="utf-8"?>
+<p:sld xmlns:a="http://schemas.openxmlformats.org/drawingml/2006/main" xmlns:r="http://schemas.openxmlformats.org/officeDocument/2006/relationships" xmlns:p="http://schemas.openxmlformats.org/presentationml/2006/main">
+  <p:cSld>
+    <p:spTree>
+      <p:nvGrpSpPr>
+        <p:cNvPr id="1" name=""/>
+        <p:cNvGrpSpPr/>
+        <p:nvPr/>
+      </p:nvGrpSpPr>
+      <p:grpSpPr>
+        <a:xfrm>
+          <a:off x="0" y="0"/>
+          <a:ext cx="0" cy="0"/>
+          <a:chOff x="0" y="0"/>
+          <a:chExt cx="0" cy="0"/>
+        </a:xfrm>
+      </p:grpSpPr>
+      <p:sp>
+        <p:nvSpPr>
+          <p:cNvPr id="2" name="Title 1"/>
+          <p:cNvSpPr>
+            <a:spLocks noGrp="1"/>
+          </p:cNvSpPr>
+          <p:nvPr>
+            <p:ph type="title"/>
+          </p:nvPr>
+        </p:nvSpPr>
+        <p:spPr/>
+        <p:txBody>
+          <a:bodyPr/>
+          <a:lstStyle/>
+          <a:p>
+            <a:pPr algn="ctr"/>
+            <a:r>
+              <a:rPr lang="sr-Cyrl-RS" dirty="0" smtClean="0">
+                <a:latin typeface="Calibri" panose="020F0502020204030204" pitchFamily="34" charset="0"/>
+                <a:cs typeface="Calibri" panose="020F0502020204030204" pitchFamily="34" charset="0"/>
+              </a:rPr>
+              <a:t>Изгенерисане базе података</a:t>
+            </a:r>
+            <a:endParaRPr lang="en-US" dirty="0">
+              <a:latin typeface="Calibri" panose="020F0502020204030204" pitchFamily="34" charset="0"/>
+              <a:cs typeface="Calibri" panose="020F0502020204030204" pitchFamily="34" charset="0"/>
+            </a:endParaRPr>
+          </a:p>
+        </p:txBody>
+      </p:sp>
+      <p:pic>
+        <p:nvPicPr>
+          <p:cNvPr id="5" name="Picture 4"/>
+          <p:cNvPicPr>
+            <a:picLocks noChangeAspect="1"/>
+          </p:cNvPicPr>
+          <p:nvPr/>
+        </p:nvPicPr>
+        <p:blipFill>
+          <a:blip r:embed="rId2"/>
+          <a:stretch>
+            <a:fillRect/>
+          </a:stretch>
+        </p:blipFill>
+        <p:spPr>
+          <a:xfrm>
+            <a:off x="5535659" y="2360081"/>
+            <a:ext cx="2941058" cy="4245791"/>
+          </a:xfrm>
+          <a:prstGeom prst="rect">
+            <a:avLst/>
+          </a:prstGeom>
+        </p:spPr>
+      </p:pic>
+      <p:pic>
+        <p:nvPicPr>
+          <p:cNvPr id="6" name="Picture 5"/>
+          <p:cNvPicPr>
+            <a:picLocks noChangeAspect="1"/>
+          </p:cNvPicPr>
+          <p:nvPr/>
+        </p:nvPicPr>
+        <p:blipFill>
+          <a:blip r:embed="rId3"/>
+          <a:stretch>
+            <a:fillRect/>
+          </a:stretch>
+        </p:blipFill>
+        <p:spPr>
+          <a:xfrm>
+            <a:off x="3011086" y="4277043"/>
+            <a:ext cx="2525418" cy="2328829"/>
+          </a:xfrm>
+          <a:prstGeom prst="rect">
+            <a:avLst/>
+          </a:prstGeom>
+        </p:spPr>
+      </p:pic>
+    </p:spTree>
+    <p:extLst>
+      <p:ext uri="{BB962C8B-B14F-4D97-AF65-F5344CB8AC3E}">
+        <p14:creationId xmlns:p14="http://schemas.microsoft.com/office/powerpoint/2010/main" val="2846244069"/>
+      </p:ext>
+    </p:extLst>
+  </p:cSld>
+  <p:clrMapOvr>
+    <a:masterClrMapping/>
+  </p:clrMapOvr>
+</p:sld>
+</file>
+
+<file path=ppt/slides/slide8.xml><?xml version="1.0" encoding="utf-8"?>
+<p:sld xmlns:a="http://schemas.openxmlformats.org/drawingml/2006/main" xmlns:r="http://schemas.openxmlformats.org/officeDocument/2006/relationships" xmlns:p="http://schemas.openxmlformats.org/presentationml/2006/main">
+  <p:cSld>
+    <p:spTree>
+      <p:nvGrpSpPr>
+        <p:cNvPr id="1" name=""/>
+        <p:cNvGrpSpPr/>
+        <p:nvPr/>
+      </p:nvGrpSpPr>
+      <p:grpSpPr>
+        <a:xfrm>
+          <a:off x="0" y="0"/>
+          <a:ext cx="0" cy="0"/>
+          <a:chOff x="0" y="0"/>
+          <a:chExt cx="0" cy="0"/>
+        </a:xfrm>
+      </p:grpSpPr>
+      <p:sp>
+        <p:nvSpPr>
+          <p:cNvPr id="2" name="Title 1"/>
+          <p:cNvSpPr>
+            <a:spLocks noGrp="1"/>
+          </p:cNvSpPr>
+          <p:nvPr>
+            <p:ph type="title"/>
+          </p:nvPr>
+        </p:nvSpPr>
+        <p:spPr/>
+        <p:txBody>
+          <a:bodyPr/>
+          <a:lstStyle/>
+          <a:p>
+            <a:endParaRPr lang="en-US"/>
+          </a:p>
+        </p:txBody>
+      </p:sp>
+      <p:sp>
+        <p:nvSpPr>
+          <p:cNvPr id="3" name="Content Placeholder 2"/>
+          <p:cNvSpPr>
+            <a:spLocks noGrp="1"/>
+          </p:cNvSpPr>
+          <p:nvPr>
+            <p:ph idx="1"/>
+          </p:nvPr>
+        </p:nvSpPr>
+        <p:spPr/>
+        <p:txBody>
+          <a:bodyPr/>
+          <a:lstStyle/>
+          <a:p>
+            <a:endParaRPr lang="en-US"/>
+          </a:p>
+        </p:txBody>
+      </p:sp>
+    </p:spTree>
+    <p:extLst>
+      <p:ext uri="{BB962C8B-B14F-4D97-AF65-F5344CB8AC3E}">
+        <p14:creationId xmlns:p14="http://schemas.microsoft.com/office/powerpoint/2010/main" val="385817558"/>
+      </p:ext>
+    </p:extLst>
+  </p:cSld>
+  <p:clrMapOvr>
+    <a:masterClrMapping/>
+  </p:clrMapOvr>
+</p:sld>
+</file>
+
+<file path=ppt/slides/slide9.xml><?xml version="1.0" encoding="utf-8"?>
+<p:sld xmlns:a="http://schemas.openxmlformats.org/drawingml/2006/main" xmlns:r="http://schemas.openxmlformats.org/officeDocument/2006/relationships" xmlns:p="http://schemas.openxmlformats.org/presentationml/2006/main">
+  <p:cSld>
+    <p:spTree>
+      <p:nvGrpSpPr>
+        <p:cNvPr id="1" name=""/>
+        <p:cNvGrpSpPr/>
+        <p:nvPr/>
+      </p:nvGrpSpPr>
+      <p:grpSpPr>
+        <a:xfrm>
+          <a:off x="0" y="0"/>
+          <a:ext cx="0" cy="0"/>
+          <a:chOff x="0" y="0"/>
+          <a:chExt cx="0" cy="0"/>
+        </a:xfrm>
+      </p:grpSpPr>
+      <p:sp>
+        <p:nvSpPr>
+          <p:cNvPr id="2" name="Title 1"/>
+          <p:cNvSpPr>
+            <a:spLocks noGrp="1"/>
+          </p:cNvSpPr>
+          <p:nvPr>
+            <p:ph type="title"/>
+          </p:nvPr>
+        </p:nvSpPr>
+        <p:spPr/>
+        <p:txBody>
+          <a:bodyPr/>
+          <a:lstStyle/>
+          <a:p>
+            <a:pPr algn="ctr"/>
+            <a:r>
+              <a:rPr lang="sr-Cyrl-RS" dirty="0" smtClean="0">
+                <a:latin typeface="Calibri" panose="020F0502020204030204" pitchFamily="34" charset="0"/>
+                <a:cs typeface="Calibri" panose="020F0502020204030204" pitchFamily="34" charset="0"/>
+              </a:rPr>
+              <a:t>Увођење информационог система</a:t>
+            </a:r>
+            <a:endParaRPr lang="en-US" dirty="0">
+              <a:latin typeface="Calibri" panose="020F0502020204030204" pitchFamily="34" charset="0"/>
+              <a:cs typeface="Calibri" panose="020F0502020204030204" pitchFamily="34" charset="0"/>
+            </a:endParaRPr>
+          </a:p>
+        </p:txBody>
+      </p:sp>
+      <p:sp>
+        <p:nvSpPr>
+          <p:cNvPr id="3" name="Content Placeholder 2"/>
+          <p:cNvSpPr>
+            <a:spLocks noGrp="1"/>
+          </p:cNvSpPr>
+          <p:nvPr>
+            <p:ph idx="1"/>
+          </p:nvPr>
+        </p:nvSpPr>
+        <p:spPr>
+          <a:xfrm>
+            <a:off x="1154954" y="2603500"/>
+            <a:ext cx="9078809" cy="3416300"/>
+          </a:xfrm>
+        </p:spPr>
+        <p:txBody>
+          <a:bodyPr>
+            <a:normAutofit/>
+          </a:bodyPr>
+          <a:lstStyle/>
+          <a:p>
+            <a:r>
+              <a:rPr lang="sr-Cyrl-RS" sz="2400" dirty="0" smtClean="0">
+                <a:latin typeface="Calibri" panose="020F0502020204030204" pitchFamily="34" charset="0"/>
+                <a:cs typeface="Calibri" panose="020F0502020204030204" pitchFamily="34" charset="0"/>
+              </a:rPr>
+              <a:t>Олакшава планирање и евидентирање обављеног посла</a:t>
+            </a:r>
+          </a:p>
+          <a:p>
+            <a:r>
+              <a:rPr lang="sr-Cyrl-RS" sz="2400" dirty="0" smtClean="0">
+                <a:latin typeface="Calibri" panose="020F0502020204030204" pitchFamily="34" charset="0"/>
+                <a:cs typeface="Calibri" panose="020F0502020204030204" pitchFamily="34" charset="0"/>
+              </a:rPr>
+              <a:t>Уводи унапређења при планирању рада запослених</a:t>
+            </a:r>
+          </a:p>
+          <a:p>
+            <a:r>
+              <a:rPr lang="sr-Cyrl-RS" sz="2400" dirty="0" smtClean="0">
+                <a:latin typeface="Calibri" panose="020F0502020204030204" pitchFamily="34" charset="0"/>
+                <a:cs typeface="Calibri" panose="020F0502020204030204" pitchFamily="34" charset="0"/>
+              </a:rPr>
+              <a:t>Омогућава запосленима да се више посвете едукацији ученика</a:t>
+            </a:r>
+          </a:p>
+          <a:p>
+            <a:r>
+              <a:rPr lang="sr-Cyrl-RS" sz="2400" dirty="0" smtClean="0">
+                <a:latin typeface="Calibri" panose="020F0502020204030204" pitchFamily="34" charset="0"/>
+                <a:cs typeface="Calibri" panose="020F0502020204030204" pitchFamily="34" charset="0"/>
+              </a:rPr>
+              <a:t>Аутоматизује процес обавештавања родитеља</a:t>
+            </a:r>
+          </a:p>
+          <a:p>
+            <a:r>
+              <a:rPr lang="sr-Cyrl-RS" sz="2400" dirty="0" smtClean="0">
+                <a:latin typeface="Calibri" panose="020F0502020204030204" pitchFamily="34" charset="0"/>
+                <a:cs typeface="Calibri" panose="020F0502020204030204" pitchFamily="34" charset="0"/>
+              </a:rPr>
+              <a:t>Представља солидну основу за даља унапређења</a:t>
+            </a:r>
+            <a:endParaRPr lang="en-US" sz="2400" dirty="0">
+              <a:latin typeface="Calibri" panose="020F0502020204030204" pitchFamily="34" charset="0"/>
+              <a:cs typeface="Calibri" panose="020F0502020204030204" pitchFamily="34" charset="0"/>
+            </a:endParaRPr>
+          </a:p>
+        </p:txBody>
+      </p:sp>
+    </p:spTree>
+    <p:extLst>
+      <p:ext uri="{BB962C8B-B14F-4D97-AF65-F5344CB8AC3E}">
+        <p14:creationId xmlns:p14="http://schemas.microsoft.com/office/powerpoint/2010/main" val="126807083"/>
       </p:ext>
     </p:extLst>
   </p:cSld>

</xml_diff>